<commit_message>
revised lectures LA SAT
</commit_message>
<xml_diff>
--- a/static/lectures/SSA_Lecture1_Intro.pptx
+++ b/static/lectures/SSA_Lecture1_Intro.pptx
@@ -225,7 +225,7 @@
           <a:p>
             <a:fld id="{C5CECB70-C66A-4DA1-9CAC-6A9714C39AA6}" type="datetimeFigureOut">
               <a:rPr lang="en-US" smtClean="0"/>
-              <a:t>10/18/2018</a:t>
+              <a:t>12/11/2018</a:t>
             </a:fld>
             <a:endParaRPr lang="en-US"/>
           </a:p>
@@ -2374,7 +2374,7 @@
           <a:p>
             <a:fld id="{96DCDAD2-BF2B-4B23-962D-FA09F549519F}" type="datetimeFigureOut">
               <a:rPr lang="en-US" smtClean="0"/>
-              <a:t>10/18/2018</a:t>
+              <a:t>12/11/2018</a:t>
             </a:fld>
             <a:endParaRPr lang="en-US"/>
           </a:p>
@@ -2598,7 +2598,7 @@
           <a:p>
             <a:fld id="{96DCDAD2-BF2B-4B23-962D-FA09F549519F}" type="datetimeFigureOut">
               <a:rPr lang="en-US" smtClean="0"/>
-              <a:t>10/18/2018</a:t>
+              <a:t>12/11/2018</a:t>
             </a:fld>
             <a:endParaRPr lang="en-US"/>
           </a:p>
@@ -2858,7 +2858,7 @@
           <a:p>
             <a:fld id="{589E5873-CF7F-45F3-B283-E59B1D6F242C}" type="datetimeFigureOut">
               <a:rPr lang="en-US" smtClean="0"/>
-              <a:t>10/18/2018</a:t>
+              <a:t>12/11/2018</a:t>
             </a:fld>
             <a:endParaRPr lang="en-US"/>
           </a:p>
@@ -3026,7 +3026,7 @@
           <a:p>
             <a:fld id="{589E5873-CF7F-45F3-B283-E59B1D6F242C}" type="datetimeFigureOut">
               <a:rPr lang="en-US" smtClean="0"/>
-              <a:t>10/18/2018</a:t>
+              <a:t>12/11/2018</a:t>
             </a:fld>
             <a:endParaRPr lang="en-US"/>
           </a:p>
@@ -3271,7 +3271,7 @@
           <a:p>
             <a:fld id="{589E5873-CF7F-45F3-B283-E59B1D6F242C}" type="datetimeFigureOut">
               <a:rPr lang="en-US" smtClean="0"/>
-              <a:t>10/18/2018</a:t>
+              <a:t>12/11/2018</a:t>
             </a:fld>
             <a:endParaRPr lang="en-US"/>
           </a:p>
@@ -3556,7 +3556,7 @@
           <a:p>
             <a:fld id="{589E5873-CF7F-45F3-B283-E59B1D6F242C}" type="datetimeFigureOut">
               <a:rPr lang="en-US" smtClean="0"/>
-              <a:t>10/18/2018</a:t>
+              <a:t>12/11/2018</a:t>
             </a:fld>
             <a:endParaRPr lang="en-US"/>
           </a:p>
@@ -3975,7 +3975,7 @@
           <a:p>
             <a:fld id="{589E5873-CF7F-45F3-B283-E59B1D6F242C}" type="datetimeFigureOut">
               <a:rPr lang="en-US" smtClean="0"/>
-              <a:t>10/18/2018</a:t>
+              <a:t>12/11/2018</a:t>
             </a:fld>
             <a:endParaRPr lang="en-US"/>
           </a:p>
@@ -4092,7 +4092,7 @@
           <a:p>
             <a:fld id="{589E5873-CF7F-45F3-B283-E59B1D6F242C}" type="datetimeFigureOut">
               <a:rPr lang="en-US" smtClean="0"/>
-              <a:t>10/18/2018</a:t>
+              <a:t>12/11/2018</a:t>
             </a:fld>
             <a:endParaRPr lang="en-US"/>
           </a:p>
@@ -4187,7 +4187,7 @@
           <a:p>
             <a:fld id="{589E5873-CF7F-45F3-B283-E59B1D6F242C}" type="datetimeFigureOut">
               <a:rPr lang="en-US" smtClean="0"/>
-              <a:t>10/18/2018</a:t>
+              <a:t>12/11/2018</a:t>
             </a:fld>
             <a:endParaRPr lang="en-US"/>
           </a:p>
@@ -4462,7 +4462,7 @@
           <a:p>
             <a:fld id="{589E5873-CF7F-45F3-B283-E59B1D6F242C}" type="datetimeFigureOut">
               <a:rPr lang="en-US" smtClean="0"/>
-              <a:t>10/18/2018</a:t>
+              <a:t>12/11/2018</a:t>
             </a:fld>
             <a:endParaRPr lang="en-US"/>
           </a:p>
@@ -4961,7 +4961,7 @@
           <a:p>
             <a:fld id="{589E5873-CF7F-45F3-B283-E59B1D6F242C}" type="datetimeFigureOut">
               <a:rPr lang="en-US" smtClean="0"/>
-              <a:t>10/18/2018</a:t>
+              <a:t>12/11/2018</a:t>
             </a:fld>
             <a:endParaRPr lang="en-US"/>
           </a:p>
@@ -5129,7 +5129,7 @@
           <a:p>
             <a:fld id="{589E5873-CF7F-45F3-B283-E59B1D6F242C}" type="datetimeFigureOut">
               <a:rPr lang="en-US" smtClean="0"/>
-              <a:t>10/18/2018</a:t>
+              <a:t>12/11/2018</a:t>
             </a:fld>
             <a:endParaRPr lang="en-US"/>
           </a:p>
@@ -5307,7 +5307,7 @@
           <a:p>
             <a:fld id="{589E5873-CF7F-45F3-B283-E59B1D6F242C}" type="datetimeFigureOut">
               <a:rPr lang="en-US" smtClean="0"/>
-              <a:t>10/18/2018</a:t>
+              <a:t>12/11/2018</a:t>
             </a:fld>
             <a:endParaRPr lang="en-US"/>
           </a:p>
@@ -5578,7 +5578,7 @@
           <a:p>
             <a:fld id="{96DCDAD2-BF2B-4B23-962D-FA09F549519F}" type="datetimeFigureOut">
               <a:rPr lang="en-US" smtClean="0"/>
-              <a:t>10/18/2018</a:t>
+              <a:t>12/11/2018</a:t>
             </a:fld>
             <a:endParaRPr lang="en-US"/>
           </a:p>
@@ -5859,7 +5859,7 @@
           <a:p>
             <a:fld id="{96DCDAD2-BF2B-4B23-962D-FA09F549519F}" type="datetimeFigureOut">
               <a:rPr lang="en-US" smtClean="0"/>
-              <a:t>10/18/2018</a:t>
+              <a:t>12/11/2018</a:t>
             </a:fld>
             <a:endParaRPr lang="en-US"/>
           </a:p>
@@ -6287,7 +6287,7 @@
           <a:p>
             <a:fld id="{96DCDAD2-BF2B-4B23-962D-FA09F549519F}" type="datetimeFigureOut">
               <a:rPr lang="en-US" smtClean="0"/>
-              <a:t>10/18/2018</a:t>
+              <a:t>12/11/2018</a:t>
             </a:fld>
             <a:endParaRPr lang="en-US"/>
           </a:p>
@@ -6444,7 +6444,7 @@
           <a:p>
             <a:fld id="{96DCDAD2-BF2B-4B23-962D-FA09F549519F}" type="datetimeFigureOut">
               <a:rPr lang="en-US" smtClean="0"/>
-              <a:t>10/18/2018</a:t>
+              <a:t>12/11/2018</a:t>
             </a:fld>
             <a:endParaRPr lang="en-US"/>
           </a:p>
@@ -6573,7 +6573,7 @@
           <a:p>
             <a:fld id="{96DCDAD2-BF2B-4B23-962D-FA09F549519F}" type="datetimeFigureOut">
               <a:rPr lang="en-US" smtClean="0"/>
-              <a:t>10/18/2018</a:t>
+              <a:t>12/11/2018</a:t>
             </a:fld>
             <a:endParaRPr lang="en-US"/>
           </a:p>
@@ -6900,7 +6900,7 @@
           <a:p>
             <a:fld id="{96DCDAD2-BF2B-4B23-962D-FA09F549519F}" type="datetimeFigureOut">
               <a:rPr lang="en-US" smtClean="0"/>
-              <a:t>10/18/2018</a:t>
+              <a:t>12/11/2018</a:t>
             </a:fld>
             <a:endParaRPr lang="en-US"/>
           </a:p>
@@ -7207,7 +7207,7 @@
           <a:p>
             <a:fld id="{96DCDAD2-BF2B-4B23-962D-FA09F549519F}" type="datetimeFigureOut">
               <a:rPr lang="en-US" smtClean="0"/>
-              <a:t>10/18/2018</a:t>
+              <a:t>12/11/2018</a:t>
             </a:fld>
             <a:endParaRPr lang="en-US"/>
           </a:p>
@@ -8008,7 +8008,7 @@
           <a:p>
             <a:fld id="{589E5873-CF7F-45F3-B283-E59B1D6F242C}" type="datetimeFigureOut">
               <a:rPr lang="en-US" smtClean="0"/>
-              <a:t>10/18/2018</a:t>
+              <a:t>12/11/2018</a:t>
             </a:fld>
             <a:endParaRPr lang="en-US"/>
           </a:p>
@@ -11000,7 +11000,7 @@
             <a:avLst/>
           </a:prstGeom>
           <a:solidFill>
-            <a:schemeClr val="tx2">
+            <a:schemeClr val="accent1">
               <a:lumMod val="60000"/>
               <a:lumOff val="40000"/>
             </a:schemeClr>
@@ -12217,6 +12217,12 @@
             <a:chOff x="-675387" y="1677008"/>
             <a:chExt cx="9325092" cy="4579870"/>
           </a:xfrm>
+          <a:solidFill>
+            <a:schemeClr val="accent1">
+              <a:lumMod val="60000"/>
+              <a:lumOff val="40000"/>
+            </a:schemeClr>
+          </a:solidFill>
         </p:grpSpPr>
         <p:sp>
           <p:nvSpPr>
@@ -12238,12 +12244,7 @@
             <a:prstGeom prst="wave">
               <a:avLst/>
             </a:prstGeom>
-            <a:solidFill>
-              <a:schemeClr val="tx2">
-                <a:lumMod val="60000"/>
-                <a:lumOff val="40000"/>
-              </a:schemeClr>
-            </a:solidFill>
+            <a:grpFill/>
             <a:ln>
               <a:noFill/>
             </a:ln>
@@ -12341,7 +12342,7 @@
                 </a:path>
               </a:pathLst>
             </a:custGeom>
-            <a:noFill/>
+            <a:grpFill/>
             <a:ln>
               <a:solidFill>
                 <a:schemeClr val="bg1"/>
@@ -12441,7 +12442,7 @@
                 </a:path>
               </a:pathLst>
             </a:custGeom>
-            <a:noFill/>
+            <a:grpFill/>
             <a:ln>
               <a:solidFill>
                 <a:schemeClr val="bg1"/>
@@ -12541,7 +12542,7 @@
                 </a:path>
               </a:pathLst>
             </a:custGeom>
-            <a:noFill/>
+            <a:grpFill/>
             <a:ln>
               <a:solidFill>
                 <a:schemeClr val="bg1"/>
@@ -12593,6 +12594,12 @@
             <a:chOff x="-675387" y="1677008"/>
             <a:chExt cx="9325092" cy="4579870"/>
           </a:xfrm>
+          <a:solidFill>
+            <a:schemeClr val="accent1">
+              <a:lumMod val="60000"/>
+              <a:lumOff val="40000"/>
+            </a:schemeClr>
+          </a:solidFill>
         </p:grpSpPr>
         <p:sp>
           <p:nvSpPr>
@@ -12614,12 +12621,7 @@
             <a:prstGeom prst="wave">
               <a:avLst/>
             </a:prstGeom>
-            <a:solidFill>
-              <a:schemeClr val="tx2">
-                <a:lumMod val="60000"/>
-                <a:lumOff val="40000"/>
-              </a:schemeClr>
-            </a:solidFill>
+            <a:grpFill/>
             <a:ln>
               <a:noFill/>
             </a:ln>
@@ -12717,7 +12719,7 @@
                 </a:path>
               </a:pathLst>
             </a:custGeom>
-            <a:noFill/>
+            <a:grpFill/>
             <a:ln>
               <a:solidFill>
                 <a:schemeClr val="bg1"/>
@@ -12817,7 +12819,7 @@
                 </a:path>
               </a:pathLst>
             </a:custGeom>
-            <a:noFill/>
+            <a:grpFill/>
             <a:ln>
               <a:solidFill>
                 <a:schemeClr val="bg1"/>
@@ -12917,7 +12919,7 @@
                 </a:path>
               </a:pathLst>
             </a:custGeom>
-            <a:noFill/>
+            <a:grpFill/>
             <a:ln>
               <a:solidFill>
                 <a:schemeClr val="bg1"/>
@@ -12965,7 +12967,7 @@
           <p:nvPr/>
         </p:nvPicPr>
         <p:blipFill>
-          <a:blip r:embed="rId3">
+          <a:blip r:embed="rId3" cstate="hqprint">
             <a:extLst>
               <a:ext uri="{28A0092B-C50C-407E-A947-70E740481C1C}">
                 <a14:useLocalDpi xmlns:a14="http://schemas.microsoft.com/office/drawing/2010/main" val="0"/>
@@ -13040,7 +13042,7 @@
           <p:nvPr/>
         </p:nvPicPr>
         <p:blipFill>
-          <a:blip r:embed="rId6">
+          <a:blip r:embed="rId6" cstate="hqprint">
             <a:extLst>
               <a:ext uri="{28A0092B-C50C-407E-A947-70E740481C1C}">
                 <a14:useLocalDpi xmlns:a14="http://schemas.microsoft.com/office/drawing/2010/main" val="0"/>
@@ -13079,7 +13081,7 @@
           <p:nvPr/>
         </p:nvPicPr>
         <p:blipFill>
-          <a:blip r:embed="rId3">
+          <a:blip r:embed="rId3" cstate="hqprint">
             <a:extLst>
               <a:ext uri="{28A0092B-C50C-407E-A947-70E740481C1C}">
                 <a14:useLocalDpi xmlns:a14="http://schemas.microsoft.com/office/drawing/2010/main" val="0"/>
@@ -13118,7 +13120,7 @@
           <p:nvPr/>
         </p:nvPicPr>
         <p:blipFill>
-          <a:blip r:embed="rId6">
+          <a:blip r:embed="rId6" cstate="hqprint">
             <a:extLst>
               <a:ext uri="{28A0092B-C50C-407E-A947-70E740481C1C}">
                 <a14:useLocalDpi xmlns:a14="http://schemas.microsoft.com/office/drawing/2010/main" val="0"/>
@@ -14041,7 +14043,7 @@
         </p:nvSpPr>
         <p:spPr>
           <a:xfrm>
-            <a:off x="2481430" y="6088828"/>
+            <a:off x="1659394" y="6024490"/>
             <a:ext cx="7229139" cy="584775"/>
           </a:xfrm>
           <a:prstGeom prst="rect">
@@ -14140,7 +14142,12 @@
             <p:ph idx="1"/>
           </p:nvPr>
         </p:nvSpPr>
-        <p:spPr/>
+        <p:spPr>
+          <a:xfrm>
+            <a:off x="838200" y="1557771"/>
+            <a:ext cx="10515600" cy="4351338"/>
+          </a:xfrm>
+        </p:spPr>
         <p:txBody>
           <a:bodyPr>
             <a:normAutofit/>
@@ -14176,12 +14183,16 @@
             <a:graphicFrameLocks noGrp="1"/>
           </p:cNvGraphicFramePr>
           <p:nvPr>
-            <p:extLst/>
+            <p:extLst>
+              <p:ext uri="{D42A27DB-BD31-4B8C-83A1-F6EECF244321}">
+                <p14:modId xmlns:p14="http://schemas.microsoft.com/office/powerpoint/2010/main" val="176438856"/>
+              </p:ext>
+            </p:extLst>
           </p:nvPr>
         </p:nvGraphicFramePr>
         <p:xfrm>
-          <a:off x="430305" y="3633563"/>
-          <a:ext cx="11553712" cy="3065591"/>
+          <a:off x="616526" y="3379198"/>
+          <a:ext cx="11145816" cy="2529911"/>
         </p:xfrm>
         <a:graphic>
           <a:graphicData uri="http://schemas.openxmlformats.org/drawingml/2006/table">
@@ -14190,28 +14201,28 @@
                 <a:tableStyleId>{5940675A-B579-460E-94D1-54222C63F5DA}</a:tableStyleId>
               </a:tblPr>
               <a:tblGrid>
-                <a:gridCol w="2888428">
+                <a:gridCol w="2786454">
                   <a:extLst>
                     <a:ext uri="{9D8B030D-6E8A-4147-A177-3AD203B41FA5}">
                       <a16:colId xmlns:a16="http://schemas.microsoft.com/office/drawing/2014/main" val="609037744"/>
                     </a:ext>
                   </a:extLst>
                 </a:gridCol>
-                <a:gridCol w="2888428">
+                <a:gridCol w="2786454">
                   <a:extLst>
                     <a:ext uri="{9D8B030D-6E8A-4147-A177-3AD203B41FA5}">
                       <a16:colId xmlns:a16="http://schemas.microsoft.com/office/drawing/2014/main" val="4068728322"/>
                     </a:ext>
                   </a:extLst>
                 </a:gridCol>
-                <a:gridCol w="2888428">
+                <a:gridCol w="2786454">
                   <a:extLst>
                     <a:ext uri="{9D8B030D-6E8A-4147-A177-3AD203B41FA5}">
                       <a16:colId xmlns:a16="http://schemas.microsoft.com/office/drawing/2014/main" val="3921382949"/>
                     </a:ext>
                   </a:extLst>
                 </a:gridCol>
-                <a:gridCol w="2888428">
+                <a:gridCol w="2786454">
                   <a:extLst>
                     <a:ext uri="{9D8B030D-6E8A-4147-A177-3AD203B41FA5}">
                       <a16:colId xmlns:a16="http://schemas.microsoft.com/office/drawing/2014/main" val="1949933557"/>
@@ -14219,7 +14230,7 @@
                   </a:extLst>
                 </a:gridCol>
               </a:tblGrid>
-              <a:tr h="909566">
+              <a:tr h="708686">
                 <a:tc>
                   <a:txBody>
                     <a:bodyPr/>
@@ -14282,7 +14293,7 @@
                   </a:ext>
                 </a:extLst>
               </a:tr>
-              <a:tr h="505315">
+              <a:tr h="393715">
                 <a:tc>
                   <a:txBody>
                     <a:bodyPr/>
@@ -14345,7 +14356,7 @@
                   </a:ext>
                 </a:extLst>
               </a:tr>
-              <a:tr h="505315">
+              <a:tr h="498716">
                 <a:tc>
                   <a:txBody>
                     <a:bodyPr/>
@@ -14408,7 +14419,7 @@
                   </a:ext>
                 </a:extLst>
               </a:tr>
-              <a:tr h="505315">
+              <a:tr h="393715">
                 <a:tc>
                   <a:txBody>
                     <a:bodyPr/>
@@ -14471,7 +14482,7 @@
                   </a:ext>
                 </a:extLst>
               </a:tr>
-              <a:tr h="505315">
+              <a:tr h="393715">
                 <a:tc>
                   <a:txBody>
                     <a:bodyPr/>
@@ -14670,13 +14681,7 @@
           <a:p>
             <a:r>
               <a:rPr lang="en-US" sz="2800" dirty="0"/>
-              <a:t>Become familiar with common terminology and approaches used in</a:t>
-            </a:r>
-          </a:p>
-          <a:p>
-            <a:r>
-              <a:rPr lang="en-US" sz="2800" dirty="0"/>
-              <a:t>population modeling including constraints, weaknesses, and underlying assumptions.</a:t>
+              <a:t>Become familiar with common terminology and approaches used in population modeling including constraints, weaknesses, and underlying assumptions.</a:t>
             </a:r>
           </a:p>
           <a:p>
@@ -15120,7 +15125,11 @@
             <p:ph idx="1"/>
           </p:nvPr>
         </p:nvSpPr>
-        <p:spPr/>
+        <p:spPr>
+          <a:ln>
+            <a:noFill/>
+          </a:ln>
+        </p:spPr>
         <p:style>
           <a:lnRef idx="2">
             <a:schemeClr val="accent2"/>

</xml_diff>